<commit_message>
I had to add one more slide to our presentation
</commit_message>
<xml_diff>
--- a/Documentation/Project Presentation (Powerpoint).pptx
+++ b/Documentation/Project Presentation (Powerpoint).pptx
@@ -24,23 +24,25 @@
     <p:sldId id="269" r:id="rId18"/>
     <p:sldId id="270" r:id="rId19"/>
     <p:sldId id="271" r:id="rId20"/>
+    <p:sldId id="272" r:id="rId21"/>
+    <p:sldId id="273" r:id="rId22"/>
   </p:sldIdLst>
   <p:sldSz cy="5143500" cx="9144000"/>
   <p:notesSz cx="6858000" cy="9144000"/>
   <p:embeddedFontLst>
     <p:embeddedFont>
       <p:font typeface="Raleway"/>
-      <p:regular r:id="rId21"/>
-      <p:bold r:id="rId22"/>
-      <p:italic r:id="rId23"/>
-      <p:boldItalic r:id="rId24"/>
+      <p:regular r:id="rId23"/>
+      <p:bold r:id="rId24"/>
+      <p:italic r:id="rId25"/>
+      <p:boldItalic r:id="rId26"/>
     </p:embeddedFont>
     <p:embeddedFont>
       <p:font typeface="Lato"/>
-      <p:regular r:id="rId25"/>
-      <p:bold r:id="rId26"/>
-      <p:italic r:id="rId27"/>
-      <p:boldItalic r:id="rId28"/>
+      <p:regular r:id="rId27"/>
+      <p:bold r:id="rId28"/>
+      <p:italic r:id="rId29"/>
+      <p:boldItalic r:id="rId30"/>
     </p:embeddedFont>
   </p:embeddedFontLst>
   <p:defaultTextStyle>
@@ -804,8 +806,8 @@
         </p:nvSpPr>
         <p:spPr>
           <a:xfrm>
-            <a:off x="381187" y="685800"/>
-            <a:ext cx="6096299" cy="3429000"/>
+            <a:off x="381300" y="685800"/>
+            <a:ext cx="6096000" cy="3429000"/>
           </a:xfrm>
           <a:custGeom>
             <a:pathLst>
@@ -877,7 +879,7 @@
   <p:cSld>
     <p:spTree>
       <p:nvGrpSpPr>
-        <p:cNvPr id="178" name="Shape 178"/>
+        <p:cNvPr id="179" name="Shape 179"/>
         <p:cNvGrpSpPr/>
         <p:nvPr/>
       </p:nvGrpSpPr>
@@ -891,7 +893,7 @@
       </p:grpSpPr>
       <p:sp>
         <p:nvSpPr>
-          <p:cNvPr id="179" name="Shape 179"/>
+          <p:cNvPr id="180" name="Shape 180"/>
           <p:cNvSpPr/>
           <p:nvPr>
             <p:ph idx="2" type="sldImg"/>
@@ -925,7 +927,7 @@
       </p:sp>
       <p:sp>
         <p:nvSpPr>
-          <p:cNvPr id="180" name="Shape 180"/>
+          <p:cNvPr id="181" name="Shape 181"/>
           <p:cNvSpPr txBox="1"/>
           <p:nvPr>
             <p:ph idx="1" type="body"/>
@@ -934,7 +936,7 @@
         <p:spPr>
           <a:xfrm>
             <a:off x="685800" y="4343400"/>
-            <a:ext cx="5486399" cy="4114800"/>
+            <a:ext cx="5486400" cy="4114800"/>
           </a:xfrm>
           <a:prstGeom prst="rect">
             <a:avLst/>
@@ -946,7 +948,7 @@
           </a:bodyPr>
           <a:lstStyle/>
           <a:p>
-            <a:pPr lvl="0">
+            <a:pPr lvl="0" rtl="0">
               <a:spcBef>
                 <a:spcPts val="0"/>
               </a:spcBef>
@@ -972,7 +974,7 @@
   <p:cSld>
     <p:spTree>
       <p:nvGrpSpPr>
-        <p:cNvPr id="183" name="Shape 183"/>
+        <p:cNvPr id="185" name="Shape 185"/>
         <p:cNvGrpSpPr/>
         <p:nvPr/>
       </p:nvGrpSpPr>
@@ -986,7 +988,7 @@
       </p:grpSpPr>
       <p:sp>
         <p:nvSpPr>
-          <p:cNvPr id="184" name="Shape 184"/>
+          <p:cNvPr id="186" name="Shape 186"/>
           <p:cNvSpPr/>
           <p:nvPr>
             <p:ph idx="2" type="sldImg"/>
@@ -994,8 +996,8 @@
         </p:nvSpPr>
         <p:spPr>
           <a:xfrm>
-            <a:off x="381300" y="685800"/>
-            <a:ext cx="6096000" cy="3429000"/>
+            <a:off x="381187" y="685800"/>
+            <a:ext cx="6096299" cy="3429000"/>
           </a:xfrm>
           <a:custGeom>
             <a:pathLst>
@@ -1020,7 +1022,7 @@
       </p:sp>
       <p:sp>
         <p:nvSpPr>
-          <p:cNvPr id="185" name="Shape 185"/>
+          <p:cNvPr id="187" name="Shape 187"/>
           <p:cNvSpPr txBox="1"/>
           <p:nvPr>
             <p:ph idx="1" type="body"/>
@@ -1029,7 +1031,7 @@
         <p:spPr>
           <a:xfrm>
             <a:off x="685800" y="4343400"/>
-            <a:ext cx="5486400" cy="4114800"/>
+            <a:ext cx="5486399" cy="4114800"/>
           </a:xfrm>
           <a:prstGeom prst="rect">
             <a:avLst/>
@@ -1067,7 +1069,7 @@
   <p:cSld>
     <p:spTree>
       <p:nvGrpSpPr>
-        <p:cNvPr id="188" name="Shape 188"/>
+        <p:cNvPr id="190" name="Shape 190"/>
         <p:cNvGrpSpPr/>
         <p:nvPr/>
       </p:nvGrpSpPr>
@@ -1081,7 +1083,7 @@
       </p:grpSpPr>
       <p:sp>
         <p:nvSpPr>
-          <p:cNvPr id="189" name="Shape 189"/>
+          <p:cNvPr id="191" name="Shape 191"/>
           <p:cNvSpPr/>
           <p:nvPr>
             <p:ph idx="2" type="sldImg"/>
@@ -1115,7 +1117,7 @@
       </p:sp>
       <p:sp>
         <p:nvSpPr>
-          <p:cNvPr id="190" name="Shape 190"/>
+          <p:cNvPr id="192" name="Shape 192"/>
           <p:cNvSpPr txBox="1"/>
           <p:nvPr>
             <p:ph idx="1" type="body"/>
@@ -1137,6 +1139,196 @@
           <a:lstStyle/>
           <a:p>
             <a:pPr lvl="0">
+              <a:spcBef>
+                <a:spcPts val="0"/>
+              </a:spcBef>
+              <a:buNone/>
+            </a:pPr>
+            <a:r>
+              <a:t/>
+            </a:r>
+            <a:endParaRPr/>
+          </a:p>
+        </p:txBody>
+      </p:sp>
+    </p:spTree>
+  </p:cSld>
+  <p:clrMapOvr>
+    <a:masterClrMapping/>
+  </p:clrMapOvr>
+</p:notes>
+</file>
+
+<file path=ppt/notesSlides/notesSlide17.xml><?xml version="1.0" encoding="utf-8"?>
+<p:notes xmlns:a="http://schemas.openxmlformats.org/drawingml/2006/main" xmlns:r="http://schemas.openxmlformats.org/officeDocument/2006/relationships" xmlns:mc="http://schemas.openxmlformats.org/markup-compatibility/2006" xmlns:mv="urn:schemas-microsoft-com:mac:vml" xmlns:p="http://schemas.openxmlformats.org/presentationml/2006/main" xmlns:c="http://schemas.openxmlformats.org/drawingml/2006/chart" xmlns:dgm="http://schemas.openxmlformats.org/drawingml/2006/diagram" xmlns:o="urn:schemas-microsoft-com:office:office" xmlns:v="urn:schemas-microsoft-com:vml" xmlns:pvml="urn:schemas-microsoft-com:office:powerpoint" xmlns:com="http://schemas.openxmlformats.org/drawingml/2006/compatibility" xmlns:p14="http://schemas.microsoft.com/office/powerpoint/2010/main" xmlns:p15="http://schemas.microsoft.com/office/powerpoint/2012/main" showMasterPhAnim="0" showMasterSp="0">
+  <p:cSld>
+    <p:spTree>
+      <p:nvGrpSpPr>
+        <p:cNvPr id="195" name="Shape 195"/>
+        <p:cNvGrpSpPr/>
+        <p:nvPr/>
+      </p:nvGrpSpPr>
+      <p:grpSpPr>
+        <a:xfrm>
+          <a:off x="0" y="0"/>
+          <a:ext cx="0" cy="0"/>
+          <a:chOff x="0" y="0"/>
+          <a:chExt cx="0" cy="0"/>
+        </a:xfrm>
+      </p:grpSpPr>
+      <p:sp>
+        <p:nvSpPr>
+          <p:cNvPr id="196" name="Shape 196"/>
+          <p:cNvSpPr/>
+          <p:nvPr>
+            <p:ph idx="2" type="sldImg"/>
+          </p:nvPr>
+        </p:nvSpPr>
+        <p:spPr>
+          <a:xfrm>
+            <a:off x="381300" y="685800"/>
+            <a:ext cx="6096000" cy="3429000"/>
+          </a:xfrm>
+          <a:custGeom>
+            <a:pathLst>
+              <a:path extrusionOk="0" h="120000" w="120000">
+                <a:moveTo>
+                  <a:pt x="0" y="0"/>
+                </a:moveTo>
+                <a:lnTo>
+                  <a:pt x="120000" y="0"/>
+                </a:lnTo>
+                <a:lnTo>
+                  <a:pt x="120000" y="120000"/>
+                </a:lnTo>
+                <a:lnTo>
+                  <a:pt x="0" y="120000"/>
+                </a:lnTo>
+                <a:close/>
+              </a:path>
+            </a:pathLst>
+          </a:custGeom>
+        </p:spPr>
+      </p:sp>
+      <p:sp>
+        <p:nvSpPr>
+          <p:cNvPr id="197" name="Shape 197"/>
+          <p:cNvSpPr txBox="1"/>
+          <p:nvPr>
+            <p:ph idx="1" type="body"/>
+          </p:nvPr>
+        </p:nvSpPr>
+        <p:spPr>
+          <a:xfrm>
+            <a:off x="685800" y="4343400"/>
+            <a:ext cx="5486400" cy="4114800"/>
+          </a:xfrm>
+          <a:prstGeom prst="rect">
+            <a:avLst/>
+          </a:prstGeom>
+        </p:spPr>
+        <p:txBody>
+          <a:bodyPr anchorCtr="0" anchor="t" bIns="91425" lIns="91425" rIns="91425" tIns="91425">
+            <a:noAutofit/>
+          </a:bodyPr>
+          <a:lstStyle/>
+          <a:p>
+            <a:pPr lvl="0">
+              <a:spcBef>
+                <a:spcPts val="0"/>
+              </a:spcBef>
+              <a:buNone/>
+            </a:pPr>
+            <a:r>
+              <a:t/>
+            </a:r>
+            <a:endParaRPr/>
+          </a:p>
+        </p:txBody>
+      </p:sp>
+    </p:spTree>
+  </p:cSld>
+  <p:clrMapOvr>
+    <a:masterClrMapping/>
+  </p:clrMapOvr>
+</p:notes>
+</file>
+
+<file path=ppt/notesSlides/notesSlide18.xml><?xml version="1.0" encoding="utf-8"?>
+<p:notes xmlns:a="http://schemas.openxmlformats.org/drawingml/2006/main" xmlns:r="http://schemas.openxmlformats.org/officeDocument/2006/relationships" xmlns:mc="http://schemas.openxmlformats.org/markup-compatibility/2006" xmlns:mv="urn:schemas-microsoft-com:mac:vml" xmlns:p="http://schemas.openxmlformats.org/presentationml/2006/main" xmlns:c="http://schemas.openxmlformats.org/drawingml/2006/chart" xmlns:dgm="http://schemas.openxmlformats.org/drawingml/2006/diagram" xmlns:o="urn:schemas-microsoft-com:office:office" xmlns:v="urn:schemas-microsoft-com:vml" xmlns:pvml="urn:schemas-microsoft-com:office:powerpoint" xmlns:com="http://schemas.openxmlformats.org/drawingml/2006/compatibility" xmlns:p14="http://schemas.microsoft.com/office/powerpoint/2010/main" xmlns:p15="http://schemas.microsoft.com/office/powerpoint/2012/main" showMasterPhAnim="0" showMasterSp="0">
+  <p:cSld>
+    <p:spTree>
+      <p:nvGrpSpPr>
+        <p:cNvPr id="200" name="Shape 200"/>
+        <p:cNvGrpSpPr/>
+        <p:nvPr/>
+      </p:nvGrpSpPr>
+      <p:grpSpPr>
+        <a:xfrm>
+          <a:off x="0" y="0"/>
+          <a:ext cx="0" cy="0"/>
+          <a:chOff x="0" y="0"/>
+          <a:chExt cx="0" cy="0"/>
+        </a:xfrm>
+      </p:grpSpPr>
+      <p:sp>
+        <p:nvSpPr>
+          <p:cNvPr id="201" name="Shape 201"/>
+          <p:cNvSpPr/>
+          <p:nvPr>
+            <p:ph idx="2" type="sldImg"/>
+          </p:nvPr>
+        </p:nvSpPr>
+        <p:spPr>
+          <a:xfrm>
+            <a:off x="381300" y="685800"/>
+            <a:ext cx="6096000" cy="3429000"/>
+          </a:xfrm>
+          <a:custGeom>
+            <a:pathLst>
+              <a:path extrusionOk="0" h="120000" w="120000">
+                <a:moveTo>
+                  <a:pt x="0" y="0"/>
+                </a:moveTo>
+                <a:lnTo>
+                  <a:pt x="120000" y="0"/>
+                </a:lnTo>
+                <a:lnTo>
+                  <a:pt x="120000" y="120000"/>
+                </a:lnTo>
+                <a:lnTo>
+                  <a:pt x="0" y="120000"/>
+                </a:lnTo>
+                <a:close/>
+              </a:path>
+            </a:pathLst>
+          </a:custGeom>
+        </p:spPr>
+      </p:sp>
+      <p:sp>
+        <p:nvSpPr>
+          <p:cNvPr id="202" name="Shape 202"/>
+          <p:cNvSpPr txBox="1"/>
+          <p:nvPr>
+            <p:ph idx="1" type="body"/>
+          </p:nvPr>
+        </p:nvSpPr>
+        <p:spPr>
+          <a:xfrm>
+            <a:off x="685800" y="4343400"/>
+            <a:ext cx="5486400" cy="4114800"/>
+          </a:xfrm>
+          <a:prstGeom prst="rect">
+            <a:avLst/>
+          </a:prstGeom>
+        </p:spPr>
+        <p:txBody>
+          <a:bodyPr anchorCtr="0" anchor="t" bIns="91425" lIns="91425" rIns="91425" tIns="91425">
+            <a:noAutofit/>
+          </a:bodyPr>
+          <a:lstStyle/>
+          <a:p>
+            <a:pPr lvl="0" rtl="0">
               <a:spcBef>
                 <a:spcPts val="0"/>
               </a:spcBef>
@@ -6673,13 +6865,49 @@
           <p:cNvPr id="176" name="Shape 176"/>
           <p:cNvSpPr txBox="1"/>
           <p:nvPr>
-            <p:ph type="ctrTitle"/>
-          </p:nvPr>
-        </p:nvSpPr>
-        <p:spPr>
-          <a:xfrm>
-            <a:off x="2371725" y="630225"/>
-            <a:ext cx="6331500" cy="2366100"/>
+            <p:ph type="title"/>
+          </p:nvPr>
+        </p:nvSpPr>
+        <p:spPr>
+          <a:xfrm>
+            <a:off x="284600" y="646687"/>
+            <a:ext cx="4045200" cy="1915200"/>
+          </a:xfrm>
+          <a:prstGeom prst="rect">
+            <a:avLst/>
+          </a:prstGeom>
+        </p:spPr>
+        <p:txBody>
+          <a:bodyPr anchorCtr="0" anchor="b" bIns="91425" lIns="91425" rIns="91425" tIns="91425">
+            <a:noAutofit/>
+          </a:bodyPr>
+          <a:lstStyle/>
+          <a:p>
+            <a:pPr lvl="0" rtl="0">
+              <a:spcBef>
+                <a:spcPts val="0"/>
+              </a:spcBef>
+              <a:buNone/>
+            </a:pPr>
+            <a:r>
+              <a:rPr lang="en"/>
+              <a:t>Entity Relationship Diagram</a:t>
+            </a:r>
+          </a:p>
+        </p:txBody>
+      </p:sp>
+      <p:sp>
+        <p:nvSpPr>
+          <p:cNvPr id="177" name="Shape 177"/>
+          <p:cNvSpPr txBox="1"/>
+          <p:nvPr>
+            <p:ph idx="1" type="subTitle"/>
+          </p:nvPr>
+        </p:nvSpPr>
+        <p:spPr>
+          <a:xfrm>
+            <a:off x="284600" y="2581612"/>
+            <a:ext cx="4045200" cy="1915200"/>
           </a:xfrm>
           <a:prstGeom prst="rect">
             <a:avLst/>
@@ -6698,52 +6926,42 @@
               <a:buNone/>
             </a:pPr>
             <a:r>
-              <a:rPr lang="en"/>
-              <a:t>What does our project look like now?</a:t>
+              <a:rPr lang="en" sz="1800"/>
+              <a:t>The Entity Relationship Diagram is a diagram which shows relationship within various entities of our program. Since our program is relatively small, with few entities, the diagram was thus small as well.</a:t>
             </a:r>
           </a:p>
         </p:txBody>
       </p:sp>
-      <p:sp>
-        <p:nvSpPr>
-          <p:cNvPr id="177" name="Shape 177"/>
-          <p:cNvSpPr txBox="1"/>
-          <p:nvPr>
-            <p:ph idx="1" type="subTitle"/>
-          </p:nvPr>
-        </p:nvSpPr>
-        <p:spPr>
-          <a:xfrm>
-            <a:off x="2371725" y="3063175"/>
-            <a:ext cx="6331500" cy="1617300"/>
+      <p:pic>
+        <p:nvPicPr>
+          <p:cNvPr descr="Entity Relationship Diagram.jpg" id="178" name="Shape 178">
+            <a:hlinkClick r:id="rId3"/>
+          </p:cNvPr>
+          <p:cNvPicPr preferRelativeResize="0"/>
+          <p:nvPr/>
+        </p:nvPicPr>
+        <p:blipFill>
+          <a:blip r:embed="rId4">
+            <a:alphaModFix/>
+          </a:blip>
+          <a:stretch>
+            <a:fillRect/>
+          </a:stretch>
+        </p:blipFill>
+        <p:spPr>
+          <a:xfrm>
+            <a:off x="4565525" y="1334600"/>
+            <a:ext cx="4578475" cy="2474300"/>
           </a:xfrm>
           <a:prstGeom prst="rect">
             <a:avLst/>
           </a:prstGeom>
-        </p:spPr>
-        <p:txBody>
-          <a:bodyPr anchorCtr="0" anchor="b" bIns="91425" lIns="91425" rIns="91425" tIns="91425">
-            <a:noAutofit/>
-          </a:bodyPr>
-          <a:lstStyle/>
-          <a:p>
-            <a:pPr lvl="0" rtl="0">
-              <a:spcBef>
-                <a:spcPts val="0"/>
-              </a:spcBef>
-              <a:buNone/>
-            </a:pPr>
-            <a:r>
-              <a:rPr lang="en" sz="2400">
-                <a:solidFill>
-                  <a:srgbClr val="FFFFFF"/>
-                </a:solidFill>
-              </a:rPr>
-              <a:t>Now that we have talked about how we went about completing this project, we will now briefly demonstrate how our application functions.</a:t>
-            </a:r>
-          </a:p>
-        </p:txBody>
-      </p:sp>
+          <a:noFill/>
+          <a:ln>
+            <a:noFill/>
+          </a:ln>
+        </p:spPr>
+      </p:pic>
     </p:spTree>
   </p:cSld>
   <p:clrMapOvr>
@@ -6757,7 +6975,7 @@
   <p:cSld>
     <p:spTree>
       <p:nvGrpSpPr>
-        <p:cNvPr id="181" name="Shape 181"/>
+        <p:cNvPr id="182" name="Shape 182"/>
         <p:cNvGrpSpPr/>
         <p:nvPr/>
       </p:nvGrpSpPr>
@@ -6771,28 +6989,28 @@
       </p:grpSpPr>
       <p:sp>
         <p:nvSpPr>
-          <p:cNvPr id="182" name="Shape 182"/>
+          <p:cNvPr id="183" name="Shape 183"/>
           <p:cNvSpPr txBox="1"/>
           <p:nvPr>
-            <p:ph type="title"/>
-          </p:nvPr>
-        </p:nvSpPr>
-        <p:spPr>
-          <a:xfrm>
-            <a:off x="406425" y="1736775"/>
-            <a:ext cx="8296800" cy="1611900"/>
+            <p:ph type="ctrTitle"/>
+          </p:nvPr>
+        </p:nvSpPr>
+        <p:spPr>
+          <a:xfrm>
+            <a:off x="2371725" y="630225"/>
+            <a:ext cx="6331500" cy="2366100"/>
           </a:xfrm>
           <a:prstGeom prst="rect">
             <a:avLst/>
           </a:prstGeom>
         </p:spPr>
         <p:txBody>
-          <a:bodyPr anchorCtr="0" anchor="ctr" bIns="91425" lIns="91425" rIns="91425" tIns="91425">
+          <a:bodyPr anchorCtr="0" anchor="t" bIns="91425" lIns="91425" rIns="91425" tIns="91425">
             <a:noAutofit/>
           </a:bodyPr>
           <a:lstStyle/>
           <a:p>
-            <a:pPr lvl="0">
+            <a:pPr lvl="0" rtl="0">
               <a:spcBef>
                 <a:spcPts val="0"/>
               </a:spcBef>
@@ -6800,7 +7018,47 @@
             </a:pPr>
             <a:r>
               <a:rPr lang="en"/>
-              <a:t>Final Remarks and Questions</a:t>
+              <a:t>What does our project look like now?</a:t>
+            </a:r>
+          </a:p>
+        </p:txBody>
+      </p:sp>
+      <p:sp>
+        <p:nvSpPr>
+          <p:cNvPr id="184" name="Shape 184"/>
+          <p:cNvSpPr txBox="1"/>
+          <p:nvPr>
+            <p:ph idx="1" type="subTitle"/>
+          </p:nvPr>
+        </p:nvSpPr>
+        <p:spPr>
+          <a:xfrm>
+            <a:off x="2371725" y="3063175"/>
+            <a:ext cx="6331500" cy="1617300"/>
+          </a:xfrm>
+          <a:prstGeom prst="rect">
+            <a:avLst/>
+          </a:prstGeom>
+        </p:spPr>
+        <p:txBody>
+          <a:bodyPr anchorCtr="0" anchor="b" bIns="91425" lIns="91425" rIns="91425" tIns="91425">
+            <a:noAutofit/>
+          </a:bodyPr>
+          <a:lstStyle/>
+          <a:p>
+            <a:pPr lvl="0" rtl="0">
+              <a:spcBef>
+                <a:spcPts val="0"/>
+              </a:spcBef>
+              <a:buNone/>
+            </a:pPr>
+            <a:r>
+              <a:rPr lang="en" sz="2400">
+                <a:solidFill>
+                  <a:srgbClr val="FFFFFF"/>
+                </a:solidFill>
+              </a:rPr>
+              <a:t>Now that we have talked about how we went about completing this project, we will now briefly demonstrate how our application functions.</a:t>
             </a:r>
           </a:p>
         </p:txBody>
@@ -6818,7 +7076,68 @@
   <p:cSld>
     <p:spTree>
       <p:nvGrpSpPr>
-        <p:cNvPr id="186" name="Shape 186"/>
+        <p:cNvPr id="188" name="Shape 188"/>
+        <p:cNvGrpSpPr/>
+        <p:nvPr/>
+      </p:nvGrpSpPr>
+      <p:grpSpPr>
+        <a:xfrm>
+          <a:off x="0" y="0"/>
+          <a:ext cx="0" cy="0"/>
+          <a:chOff x="0" y="0"/>
+          <a:chExt cx="0" cy="0"/>
+        </a:xfrm>
+      </p:grpSpPr>
+      <p:sp>
+        <p:nvSpPr>
+          <p:cNvPr id="189" name="Shape 189"/>
+          <p:cNvSpPr txBox="1"/>
+          <p:nvPr>
+            <p:ph type="title"/>
+          </p:nvPr>
+        </p:nvSpPr>
+        <p:spPr>
+          <a:xfrm>
+            <a:off x="406425" y="1736775"/>
+            <a:ext cx="8296800" cy="1611900"/>
+          </a:xfrm>
+          <a:prstGeom prst="rect">
+            <a:avLst/>
+          </a:prstGeom>
+        </p:spPr>
+        <p:txBody>
+          <a:bodyPr anchorCtr="0" anchor="ctr" bIns="91425" lIns="91425" rIns="91425" tIns="91425">
+            <a:noAutofit/>
+          </a:bodyPr>
+          <a:lstStyle/>
+          <a:p>
+            <a:pPr lvl="0">
+              <a:spcBef>
+                <a:spcPts val="0"/>
+              </a:spcBef>
+              <a:buNone/>
+            </a:pPr>
+            <a:r>
+              <a:rPr lang="en"/>
+              <a:t>Final Remarks and Questions</a:t>
+            </a:r>
+          </a:p>
+        </p:txBody>
+      </p:sp>
+    </p:spTree>
+  </p:cSld>
+  <p:clrMapOvr>
+    <a:masterClrMapping/>
+  </p:clrMapOvr>
+</p:sld>
+</file>
+
+<file path=ppt/slides/slide16.xml><?xml version="1.0" encoding="utf-8"?>
+<p:sld xmlns:a="http://schemas.openxmlformats.org/drawingml/2006/main" xmlns:r="http://schemas.openxmlformats.org/officeDocument/2006/relationships" xmlns:mc="http://schemas.openxmlformats.org/markup-compatibility/2006" xmlns:mv="urn:schemas-microsoft-com:mac:vml" xmlns:p="http://schemas.openxmlformats.org/presentationml/2006/main" xmlns:c="http://schemas.openxmlformats.org/drawingml/2006/chart" xmlns:dgm="http://schemas.openxmlformats.org/drawingml/2006/diagram" xmlns:o="urn:schemas-microsoft-com:office:office" xmlns:v="urn:schemas-microsoft-com:vml" xmlns:pvml="urn:schemas-microsoft-com:office:powerpoint" xmlns:com="http://schemas.openxmlformats.org/drawingml/2006/compatibility" xmlns:p14="http://schemas.microsoft.com/office/powerpoint/2010/main" xmlns:p15="http://schemas.microsoft.com/office/powerpoint/2012/main">
+  <p:cSld>
+    <p:spTree>
+      <p:nvGrpSpPr>
+        <p:cNvPr id="193" name="Shape 193"/>
         <p:cNvGrpSpPr/>
         <p:nvPr/>
       </p:nvGrpSpPr>
@@ -6832,7 +7151,7 @@
       </p:grpSpPr>
       <p:pic>
         <p:nvPicPr>
-          <p:cNvPr descr="Class Diagram.jpeg" id="187" name="Shape 187">
+          <p:cNvPr descr="Class Diagram.jpeg" id="194" name="Shape 194">
             <a:hlinkClick r:id="rId3"/>
           </p:cNvPr>
           <p:cNvPicPr preferRelativeResize="0"/>
@@ -6868,12 +7187,12 @@
 </p:sld>
 </file>
 
-<file path=ppt/slides/slide16.xml><?xml version="1.0" encoding="utf-8"?>
+<file path=ppt/slides/slide17.xml><?xml version="1.0" encoding="utf-8"?>
 <p:sld xmlns:a="http://schemas.openxmlformats.org/drawingml/2006/main" xmlns:r="http://schemas.openxmlformats.org/officeDocument/2006/relationships" xmlns:mc="http://schemas.openxmlformats.org/markup-compatibility/2006" xmlns:mv="urn:schemas-microsoft-com:mac:vml" xmlns:p="http://schemas.openxmlformats.org/presentationml/2006/main" xmlns:c="http://schemas.openxmlformats.org/drawingml/2006/chart" xmlns:dgm="http://schemas.openxmlformats.org/drawingml/2006/diagram" xmlns:o="urn:schemas-microsoft-com:office:office" xmlns:v="urn:schemas-microsoft-com:vml" xmlns:pvml="urn:schemas-microsoft-com:office:powerpoint" xmlns:com="http://schemas.openxmlformats.org/drawingml/2006/compatibility" xmlns:p14="http://schemas.microsoft.com/office/powerpoint/2010/main" xmlns:p15="http://schemas.microsoft.com/office/powerpoint/2012/main">
   <p:cSld>
     <p:spTree>
       <p:nvGrpSpPr>
-        <p:cNvPr id="191" name="Shape 191"/>
+        <p:cNvPr id="198" name="Shape 198"/>
         <p:cNvGrpSpPr/>
         <p:nvPr/>
       </p:nvGrpSpPr>
@@ -6887,7 +7206,7 @@
       </p:grpSpPr>
       <p:pic>
         <p:nvPicPr>
-          <p:cNvPr descr="Behavior State Machine Diagram.jpeg" id="192" name="Shape 192">
+          <p:cNvPr descr="Behavior State Machine Diagram.jpeg" id="199" name="Shape 199">
             <a:hlinkClick r:id="rId3"/>
           </p:cNvPr>
           <p:cNvPicPr preferRelativeResize="0"/>
@@ -6905,6 +7224,61 @@
           <a:xfrm>
             <a:off x="1757087" y="0"/>
             <a:ext cx="5629834" cy="5143501"/>
+          </a:xfrm>
+          <a:prstGeom prst="rect">
+            <a:avLst/>
+          </a:prstGeom>
+          <a:noFill/>
+          <a:ln>
+            <a:noFill/>
+          </a:ln>
+        </p:spPr>
+      </p:pic>
+    </p:spTree>
+  </p:cSld>
+  <p:clrMapOvr>
+    <a:masterClrMapping/>
+  </p:clrMapOvr>
+</p:sld>
+</file>
+
+<file path=ppt/slides/slide18.xml><?xml version="1.0" encoding="utf-8"?>
+<p:sld xmlns:a="http://schemas.openxmlformats.org/drawingml/2006/main" xmlns:r="http://schemas.openxmlformats.org/officeDocument/2006/relationships" xmlns:mc="http://schemas.openxmlformats.org/markup-compatibility/2006" xmlns:mv="urn:schemas-microsoft-com:mac:vml" xmlns:p="http://schemas.openxmlformats.org/presentationml/2006/main" xmlns:c="http://schemas.openxmlformats.org/drawingml/2006/chart" xmlns:dgm="http://schemas.openxmlformats.org/drawingml/2006/diagram" xmlns:o="urn:schemas-microsoft-com:office:office" xmlns:v="urn:schemas-microsoft-com:vml" xmlns:pvml="urn:schemas-microsoft-com:office:powerpoint" xmlns:com="http://schemas.openxmlformats.org/drawingml/2006/compatibility" xmlns:p14="http://schemas.microsoft.com/office/powerpoint/2010/main" xmlns:p15="http://schemas.microsoft.com/office/powerpoint/2012/main">
+  <p:cSld>
+    <p:spTree>
+      <p:nvGrpSpPr>
+        <p:cNvPr id="203" name="Shape 203"/>
+        <p:cNvGrpSpPr/>
+        <p:nvPr/>
+      </p:nvGrpSpPr>
+      <p:grpSpPr>
+        <a:xfrm>
+          <a:off x="0" y="0"/>
+          <a:ext cx="0" cy="0"/>
+          <a:chOff x="0" y="0"/>
+          <a:chExt cx="0" cy="0"/>
+        </a:xfrm>
+      </p:grpSpPr>
+      <p:pic>
+        <p:nvPicPr>
+          <p:cNvPr descr="Entity Relationship Diagram.jpg" id="204" name="Shape 204">
+            <a:hlinkClick r:id="rId3"/>
+          </p:cNvPr>
+          <p:cNvPicPr preferRelativeResize="0"/>
+          <p:nvPr/>
+        </p:nvPicPr>
+        <p:blipFill>
+          <a:blip r:embed="rId4">
+            <a:alphaModFix/>
+          </a:blip>
+          <a:stretch>
+            <a:fillRect/>
+          </a:stretch>
+        </p:blipFill>
+        <p:spPr>
+          <a:xfrm>
+            <a:off x="0" y="100959"/>
+            <a:ext cx="9144000" cy="4941580"/>
           </a:xfrm>
           <a:prstGeom prst="rect">
             <a:avLst/>

</xml_diff>